<commit_message>
Added the additional requirements
</commit_message>
<xml_diff>
--- a/mocs.pptx
+++ b/mocs.pptx
@@ -9,6 +9,7 @@
     <p:sldId id="256" r:id="rId3"/>
     <p:sldId id="258" r:id="rId4"/>
     <p:sldId id="257" r:id="rId5"/>
+    <p:sldId id="260" r:id="rId6"/>
   </p:sldIdLst>
   <p:sldSz cx="9144000" cy="6858000" type="screen4x3"/>
   <p:notesSz cx="6858000" cy="9144000"/>
@@ -291,7 +292,7 @@
           <a:p>
             <a:fld id="{73E1F066-128C-4418-BEBF-9ADA5160E079}" type="datetimeFigureOut">
               <a:rPr lang="en-IN" smtClean="0"/>
-              <a:t>01-01-2018</a:t>
+              <a:t>02-01-2018</a:t>
             </a:fld>
             <a:endParaRPr lang="en-IN"/>
           </a:p>
@@ -461,7 +462,7 @@
           <a:p>
             <a:fld id="{73E1F066-128C-4418-BEBF-9ADA5160E079}" type="datetimeFigureOut">
               <a:rPr lang="en-IN" smtClean="0"/>
-              <a:t>01-01-2018</a:t>
+              <a:t>02-01-2018</a:t>
             </a:fld>
             <a:endParaRPr lang="en-IN"/>
           </a:p>
@@ -641,7 +642,7 @@
           <a:p>
             <a:fld id="{73E1F066-128C-4418-BEBF-9ADA5160E079}" type="datetimeFigureOut">
               <a:rPr lang="en-IN" smtClean="0"/>
-              <a:t>01-01-2018</a:t>
+              <a:t>02-01-2018</a:t>
             </a:fld>
             <a:endParaRPr lang="en-IN"/>
           </a:p>
@@ -811,7 +812,7 @@
           <a:p>
             <a:fld id="{73E1F066-128C-4418-BEBF-9ADA5160E079}" type="datetimeFigureOut">
               <a:rPr lang="en-IN" smtClean="0"/>
-              <a:t>01-01-2018</a:t>
+              <a:t>02-01-2018</a:t>
             </a:fld>
             <a:endParaRPr lang="en-IN"/>
           </a:p>
@@ -1057,7 +1058,7 @@
           <a:p>
             <a:fld id="{73E1F066-128C-4418-BEBF-9ADA5160E079}" type="datetimeFigureOut">
               <a:rPr lang="en-IN" smtClean="0"/>
-              <a:t>01-01-2018</a:t>
+              <a:t>02-01-2018</a:t>
             </a:fld>
             <a:endParaRPr lang="en-IN"/>
           </a:p>
@@ -1345,7 +1346,7 @@
           <a:p>
             <a:fld id="{73E1F066-128C-4418-BEBF-9ADA5160E079}" type="datetimeFigureOut">
               <a:rPr lang="en-IN" smtClean="0"/>
-              <a:t>01-01-2018</a:t>
+              <a:t>02-01-2018</a:t>
             </a:fld>
             <a:endParaRPr lang="en-IN"/>
           </a:p>
@@ -1767,7 +1768,7 @@
           <a:p>
             <a:fld id="{73E1F066-128C-4418-BEBF-9ADA5160E079}" type="datetimeFigureOut">
               <a:rPr lang="en-IN" smtClean="0"/>
-              <a:t>01-01-2018</a:t>
+              <a:t>02-01-2018</a:t>
             </a:fld>
             <a:endParaRPr lang="en-IN"/>
           </a:p>
@@ -1885,7 +1886,7 @@
           <a:p>
             <a:fld id="{73E1F066-128C-4418-BEBF-9ADA5160E079}" type="datetimeFigureOut">
               <a:rPr lang="en-IN" smtClean="0"/>
-              <a:t>01-01-2018</a:t>
+              <a:t>02-01-2018</a:t>
             </a:fld>
             <a:endParaRPr lang="en-IN"/>
           </a:p>
@@ -1980,7 +1981,7 @@
           <a:p>
             <a:fld id="{73E1F066-128C-4418-BEBF-9ADA5160E079}" type="datetimeFigureOut">
               <a:rPr lang="en-IN" smtClean="0"/>
-              <a:t>01-01-2018</a:t>
+              <a:t>02-01-2018</a:t>
             </a:fld>
             <a:endParaRPr lang="en-IN"/>
           </a:p>
@@ -2257,7 +2258,7 @@
           <a:p>
             <a:fld id="{73E1F066-128C-4418-BEBF-9ADA5160E079}" type="datetimeFigureOut">
               <a:rPr lang="en-IN" smtClean="0"/>
-              <a:t>01-01-2018</a:t>
+              <a:t>02-01-2018</a:t>
             </a:fld>
             <a:endParaRPr lang="en-IN"/>
           </a:p>
@@ -2510,7 +2511,7 @@
           <a:p>
             <a:fld id="{73E1F066-128C-4418-BEBF-9ADA5160E079}" type="datetimeFigureOut">
               <a:rPr lang="en-IN" smtClean="0"/>
-              <a:t>01-01-2018</a:t>
+              <a:t>02-01-2018</a:t>
             </a:fld>
             <a:endParaRPr lang="en-IN"/>
           </a:p>
@@ -2723,7 +2724,7 @@
           <a:p>
             <a:fld id="{73E1F066-128C-4418-BEBF-9ADA5160E079}" type="datetimeFigureOut">
               <a:rPr lang="en-IN" smtClean="0"/>
-              <a:t>01-01-2018</a:t>
+              <a:t>02-01-2018</a:t>
             </a:fld>
             <a:endParaRPr lang="en-IN"/>
           </a:p>
@@ -5822,6 +5823,379 @@
     <p:extLst>
       <p:ext uri="{BB962C8B-B14F-4D97-AF65-F5344CB8AC3E}">
         <p14:creationId xmlns:p14="http://schemas.microsoft.com/office/powerpoint/2010/main" val="85272835"/>
+      </p:ext>
+    </p:extLst>
+  </p:cSld>
+  <p:clrMapOvr>
+    <a:masterClrMapping/>
+  </p:clrMapOvr>
+</p:sld>
+</file>
+
+<file path=ppt/slides/slide5.xml><?xml version="1.0" encoding="utf-8"?>
+<p:sld xmlns:a="http://schemas.openxmlformats.org/drawingml/2006/main" xmlns:r="http://schemas.openxmlformats.org/officeDocument/2006/relationships" xmlns:p="http://schemas.openxmlformats.org/presentationml/2006/main">
+  <p:cSld>
+    <p:spTree>
+      <p:nvGrpSpPr>
+        <p:cNvPr id="1" name=""/>
+        <p:cNvGrpSpPr/>
+        <p:nvPr/>
+      </p:nvGrpSpPr>
+      <p:grpSpPr>
+        <a:xfrm>
+          <a:off x="0" y="0"/>
+          <a:ext cx="0" cy="0"/>
+          <a:chOff x="0" y="0"/>
+          <a:chExt cx="0" cy="0"/>
+        </a:xfrm>
+      </p:grpSpPr>
+      <p:sp>
+        <p:nvSpPr>
+          <p:cNvPr id="4" name="Rectangle 3"/>
+          <p:cNvSpPr/>
+          <p:nvPr/>
+        </p:nvSpPr>
+        <p:spPr>
+          <a:xfrm>
+            <a:off x="3419872" y="1340768"/>
+            <a:ext cx="3816424" cy="2160240"/>
+          </a:xfrm>
+          <a:prstGeom prst="rect">
+            <a:avLst/>
+          </a:prstGeom>
+        </p:spPr>
+        <p:style>
+          <a:lnRef idx="2">
+            <a:schemeClr val="accent1">
+              <a:shade val="50000"/>
+            </a:schemeClr>
+          </a:lnRef>
+          <a:fillRef idx="1">
+            <a:schemeClr val="accent1"/>
+          </a:fillRef>
+          <a:effectRef idx="0">
+            <a:schemeClr val="accent1"/>
+          </a:effectRef>
+          <a:fontRef idx="minor">
+            <a:schemeClr val="lt1"/>
+          </a:fontRef>
+        </p:style>
+        <p:txBody>
+          <a:bodyPr rtlCol="0" anchor="ctr"/>
+          <a:lstStyle/>
+          <a:p>
+            <a:pPr algn="ctr"/>
+            <a:endParaRPr lang="en-IN"/>
+          </a:p>
+        </p:txBody>
+      </p:sp>
+      <p:sp>
+        <p:nvSpPr>
+          <p:cNvPr id="6" name="Rectangle 5"/>
+          <p:cNvSpPr/>
+          <p:nvPr/>
+        </p:nvSpPr>
+        <p:spPr>
+          <a:xfrm>
+            <a:off x="3131840" y="1700808"/>
+            <a:ext cx="3816424" cy="2160240"/>
+          </a:xfrm>
+          <a:prstGeom prst="rect">
+            <a:avLst/>
+          </a:prstGeom>
+        </p:spPr>
+        <p:style>
+          <a:lnRef idx="2">
+            <a:schemeClr val="accent1">
+              <a:shade val="50000"/>
+            </a:schemeClr>
+          </a:lnRef>
+          <a:fillRef idx="1">
+            <a:schemeClr val="accent1"/>
+          </a:fillRef>
+          <a:effectRef idx="0">
+            <a:schemeClr val="accent1"/>
+          </a:effectRef>
+          <a:fontRef idx="minor">
+            <a:schemeClr val="lt1"/>
+          </a:fontRef>
+        </p:style>
+        <p:txBody>
+          <a:bodyPr rtlCol="0" anchor="ctr"/>
+          <a:lstStyle/>
+          <a:p>
+            <a:pPr algn="ctr"/>
+            <a:endParaRPr lang="en-IN"/>
+          </a:p>
+        </p:txBody>
+      </p:sp>
+      <p:sp>
+        <p:nvSpPr>
+          <p:cNvPr id="7" name="Rectangle 6"/>
+          <p:cNvSpPr/>
+          <p:nvPr/>
+        </p:nvSpPr>
+        <p:spPr>
+          <a:xfrm>
+            <a:off x="2771800" y="2132856"/>
+            <a:ext cx="3816424" cy="2160240"/>
+          </a:xfrm>
+          <a:prstGeom prst="rect">
+            <a:avLst/>
+          </a:prstGeom>
+        </p:spPr>
+        <p:style>
+          <a:lnRef idx="2">
+            <a:schemeClr val="accent1">
+              <a:shade val="50000"/>
+            </a:schemeClr>
+          </a:lnRef>
+          <a:fillRef idx="1">
+            <a:schemeClr val="accent1"/>
+          </a:fillRef>
+          <a:effectRef idx="0">
+            <a:schemeClr val="accent1"/>
+          </a:effectRef>
+          <a:fontRef idx="minor">
+            <a:schemeClr val="lt1"/>
+          </a:fontRef>
+        </p:style>
+        <p:txBody>
+          <a:bodyPr rtlCol="0" anchor="ctr"/>
+          <a:lstStyle/>
+          <a:p>
+            <a:pPr algn="ctr"/>
+            <a:endParaRPr lang="en-IN"/>
+          </a:p>
+        </p:txBody>
+      </p:sp>
+      <p:sp>
+        <p:nvSpPr>
+          <p:cNvPr id="8" name="Rectangle 7"/>
+          <p:cNvSpPr/>
+          <p:nvPr/>
+        </p:nvSpPr>
+        <p:spPr>
+          <a:xfrm>
+            <a:off x="2411760" y="2564904"/>
+            <a:ext cx="3816424" cy="2160240"/>
+          </a:xfrm>
+          <a:prstGeom prst="rect">
+            <a:avLst/>
+          </a:prstGeom>
+          <a:solidFill>
+            <a:schemeClr val="bg1"/>
+          </a:solidFill>
+        </p:spPr>
+        <p:style>
+          <a:lnRef idx="2">
+            <a:schemeClr val="accent1">
+              <a:shade val="50000"/>
+            </a:schemeClr>
+          </a:lnRef>
+          <a:fillRef idx="1">
+            <a:schemeClr val="accent1"/>
+          </a:fillRef>
+          <a:effectRef idx="0">
+            <a:schemeClr val="accent1"/>
+          </a:effectRef>
+          <a:fontRef idx="minor">
+            <a:schemeClr val="lt1"/>
+          </a:fontRef>
+        </p:style>
+        <p:txBody>
+          <a:bodyPr rtlCol="0" anchor="ctr"/>
+          <a:lstStyle/>
+          <a:p>
+            <a:pPr algn="ctr"/>
+            <a:endParaRPr lang="en-IN"/>
+          </a:p>
+        </p:txBody>
+      </p:sp>
+      <p:sp>
+        <p:nvSpPr>
+          <p:cNvPr id="11" name="TextBox 10"/>
+          <p:cNvSpPr txBox="1"/>
+          <p:nvPr/>
+        </p:nvSpPr>
+        <p:spPr>
+          <a:xfrm>
+            <a:off x="2523385" y="2780928"/>
+            <a:ext cx="1352358" cy="307777"/>
+          </a:xfrm>
+          <a:prstGeom prst="rect">
+            <a:avLst/>
+          </a:prstGeom>
+          <a:noFill/>
+        </p:spPr>
+        <p:txBody>
+          <a:bodyPr wrap="none" rtlCol="0">
+            <a:spAutoFit/>
+          </a:bodyPr>
+          <a:lstStyle/>
+          <a:p>
+            <a:r>
+              <a:rPr lang="en-IN" sz="1400" dirty="0" smtClean="0"/>
+              <a:t>Subreddit_topic</a:t>
+            </a:r>
+            <a:endParaRPr lang="en-IN" sz="1400" dirty="0"/>
+          </a:p>
+        </p:txBody>
+      </p:sp>
+      <p:sp>
+        <p:nvSpPr>
+          <p:cNvPr id="12" name="Rectangle 11"/>
+          <p:cNvSpPr/>
+          <p:nvPr/>
+        </p:nvSpPr>
+        <p:spPr>
+          <a:xfrm>
+            <a:off x="2558243" y="3228336"/>
+            <a:ext cx="3498304" cy="1352792"/>
+          </a:xfrm>
+          <a:prstGeom prst="rect">
+            <a:avLst/>
+          </a:prstGeom>
+          <a:solidFill>
+            <a:schemeClr val="bg1"/>
+          </a:solidFill>
+          <a:ln w="9525"/>
+        </p:spPr>
+        <p:style>
+          <a:lnRef idx="2">
+            <a:schemeClr val="accent1">
+              <a:shade val="50000"/>
+            </a:schemeClr>
+          </a:lnRef>
+          <a:fillRef idx="1">
+            <a:schemeClr val="accent1"/>
+          </a:fillRef>
+          <a:effectRef idx="0">
+            <a:schemeClr val="accent1"/>
+          </a:effectRef>
+          <a:fontRef idx="minor">
+            <a:schemeClr val="lt1"/>
+          </a:fontRef>
+        </p:style>
+        <p:txBody>
+          <a:bodyPr rtlCol="0" anchor="ctr"/>
+          <a:lstStyle/>
+          <a:p>
+            <a:pPr algn="ctr"/>
+            <a:endParaRPr lang="en-IN"/>
+          </a:p>
+        </p:txBody>
+      </p:sp>
+      <p:sp>
+        <p:nvSpPr>
+          <p:cNvPr id="13" name="Rectangle 12"/>
+          <p:cNvSpPr/>
+          <p:nvPr/>
+        </p:nvSpPr>
+        <p:spPr>
+          <a:xfrm>
+            <a:off x="2672171" y="3410598"/>
+            <a:ext cx="648072" cy="792088"/>
+          </a:xfrm>
+          <a:prstGeom prst="rect">
+            <a:avLst/>
+          </a:prstGeom>
+        </p:spPr>
+        <p:style>
+          <a:lnRef idx="2">
+            <a:schemeClr val="accent1">
+              <a:shade val="50000"/>
+            </a:schemeClr>
+          </a:lnRef>
+          <a:fillRef idx="1">
+            <a:schemeClr val="accent1"/>
+          </a:fillRef>
+          <a:effectRef idx="0">
+            <a:schemeClr val="accent1"/>
+          </a:effectRef>
+          <a:fontRef idx="minor">
+            <a:schemeClr val="lt1"/>
+          </a:fontRef>
+        </p:style>
+        <p:txBody>
+          <a:bodyPr rtlCol="0" anchor="ctr"/>
+          <a:lstStyle/>
+          <a:p>
+            <a:pPr algn="ctr"/>
+            <a:endParaRPr lang="en-IN"/>
+          </a:p>
+        </p:txBody>
+      </p:sp>
+      <p:sp>
+        <p:nvSpPr>
+          <p:cNvPr id="14" name="TextBox 13"/>
+          <p:cNvSpPr txBox="1"/>
+          <p:nvPr/>
+        </p:nvSpPr>
+        <p:spPr>
+          <a:xfrm>
+            <a:off x="3484092" y="3296833"/>
+            <a:ext cx="1646605" cy="338554"/>
+          </a:xfrm>
+          <a:prstGeom prst="rect">
+            <a:avLst/>
+          </a:prstGeom>
+          <a:noFill/>
+        </p:spPr>
+        <p:txBody>
+          <a:bodyPr wrap="none" rtlCol="0">
+            <a:spAutoFit/>
+          </a:bodyPr>
+          <a:lstStyle/>
+          <a:p>
+            <a:r>
+              <a:rPr lang="en-IN" sz="1600" dirty="0" smtClean="0"/>
+              <a:t>Article_1_Header</a:t>
+            </a:r>
+            <a:endParaRPr lang="en-IN" sz="1600" dirty="0"/>
+          </a:p>
+        </p:txBody>
+      </p:sp>
+      <p:sp>
+        <p:nvSpPr>
+          <p:cNvPr id="15" name="TextBox 14"/>
+          <p:cNvSpPr txBox="1"/>
+          <p:nvPr/>
+        </p:nvSpPr>
+        <p:spPr>
+          <a:xfrm>
+            <a:off x="3751825" y="3652753"/>
+            <a:ext cx="1111138" cy="523220"/>
+          </a:xfrm>
+          <a:prstGeom prst="rect">
+            <a:avLst/>
+          </a:prstGeom>
+          <a:noFill/>
+        </p:spPr>
+        <p:txBody>
+          <a:bodyPr wrap="none" rtlCol="0">
+            <a:spAutoFit/>
+          </a:bodyPr>
+          <a:lstStyle/>
+          <a:p>
+            <a:r>
+              <a:rPr lang="en-IN" sz="1400" dirty="0" smtClean="0"/>
+              <a:t>Subtext………</a:t>
+            </a:r>
+          </a:p>
+          <a:p>
+            <a:r>
+              <a:rPr lang="en-IN" sz="1400" dirty="0" smtClean="0"/>
+              <a:t>………</a:t>
+            </a:r>
+            <a:endParaRPr lang="en-IN" sz="1400" dirty="0"/>
+          </a:p>
+        </p:txBody>
+      </p:sp>
+    </p:spTree>
+    <p:extLst>
+      <p:ext uri="{BB962C8B-B14F-4D97-AF65-F5344CB8AC3E}">
+        <p14:creationId xmlns:p14="http://schemas.microsoft.com/office/powerpoint/2010/main" val="898668990"/>
       </p:ext>
     </p:extLst>
   </p:cSld>

</xml_diff>